<commit_message>
updated index2 and svpcss and the PP SVP-LLM-Web2.
</commit_message>
<xml_diff>
--- a/SVP-mobiweb-web-guide-Wed-2.pptx
+++ b/SVP-mobiweb-web-guide-Wed-2.pptx
@@ -14,17 +14,17 @@
     <p:sldId id="269" r:id="rId8"/>
     <p:sldId id="258" r:id="rId9"/>
     <p:sldId id="259" r:id="rId10"/>
-    <p:sldId id="270" r:id="rId11"/>
-    <p:sldId id="263" r:id="rId12"/>
-    <p:sldId id="271" r:id="rId13"/>
+    <p:sldId id="263" r:id="rId11"/>
+    <p:sldId id="271" r:id="rId12"/>
+    <p:sldId id="272" r:id="rId13"/>
     <p:sldId id="273" r:id="rId14"/>
-    <p:sldId id="272" r:id="rId15"/>
-    <p:sldId id="261" r:id="rId16"/>
-    <p:sldId id="262" r:id="rId17"/>
-    <p:sldId id="264" r:id="rId18"/>
-    <p:sldId id="274" r:id="rId19"/>
-    <p:sldId id="275" r:id="rId20"/>
-    <p:sldId id="276" r:id="rId21"/>
+    <p:sldId id="261" r:id="rId15"/>
+    <p:sldId id="262" r:id="rId16"/>
+    <p:sldId id="264" r:id="rId17"/>
+    <p:sldId id="274" r:id="rId18"/>
+    <p:sldId id="275" r:id="rId19"/>
+    <p:sldId id="276" r:id="rId20"/>
+    <p:sldId id="277" r:id="rId21"/>
   </p:sldIdLst>
   <p:sldSz cx="12192000" cy="6858000"/>
   <p:notesSz cx="6858000" cy="9144000"/>
@@ -1341,7 +1341,7 @@
           <a:p>
             <a:fld id="{9BA68BF7-7197-B04D-ADD6-A4F729BF548A}" type="datetimeFigureOut">
               <a:rPr lang="en-US" smtClean="0"/>
-              <a:t>8/20/24</a:t>
+              <a:t>8/21/24</a:t>
             </a:fld>
             <a:endParaRPr lang="en-US"/>
           </a:p>
@@ -1579,7 +1579,7 @@
           <a:p>
             <a:fld id="{9BA68BF7-7197-B04D-ADD6-A4F729BF548A}" type="datetimeFigureOut">
               <a:rPr lang="en-US" smtClean="0"/>
-              <a:t>8/20/24</a:t>
+              <a:t>8/21/24</a:t>
             </a:fld>
             <a:endParaRPr lang="en-US"/>
           </a:p>
@@ -1759,7 +1759,7 @@
           <a:p>
             <a:fld id="{9BA68BF7-7197-B04D-ADD6-A4F729BF548A}" type="datetimeFigureOut">
               <a:rPr lang="en-US" smtClean="0"/>
-              <a:t>8/20/24</a:t>
+              <a:t>8/21/24</a:t>
             </a:fld>
             <a:endParaRPr lang="en-US"/>
           </a:p>
@@ -1954,7 +1954,7 @@
           <a:p>
             <a:fld id="{9BA68BF7-7197-B04D-ADD6-A4F729BF548A}" type="datetimeFigureOut">
               <a:rPr lang="en-US" smtClean="0"/>
-              <a:t>8/20/24</a:t>
+              <a:t>8/21/24</a:t>
             </a:fld>
             <a:endParaRPr lang="en-US"/>
           </a:p>
@@ -2230,7 +2230,7 @@
           <a:p>
             <a:fld id="{9BA68BF7-7197-B04D-ADD6-A4F729BF548A}" type="datetimeFigureOut">
               <a:rPr lang="en-US" smtClean="0"/>
-              <a:t>8/20/24</a:t>
+              <a:t>8/21/24</a:t>
             </a:fld>
             <a:endParaRPr lang="en-US"/>
           </a:p>
@@ -3430,7 +3430,7 @@
           <a:p>
             <a:fld id="{9BA68BF7-7197-B04D-ADD6-A4F729BF548A}" type="datetimeFigureOut">
               <a:rPr lang="en-US" smtClean="0"/>
-              <a:t>8/20/24</a:t>
+              <a:t>8/21/24</a:t>
             </a:fld>
             <a:endParaRPr lang="en-US"/>
           </a:p>
@@ -3819,7 +3819,7 @@
           <a:p>
             <a:fld id="{9BA68BF7-7197-B04D-ADD6-A4F729BF548A}" type="datetimeFigureOut">
               <a:rPr lang="en-US" smtClean="0"/>
-              <a:t>8/20/24</a:t>
+              <a:t>8/21/24</a:t>
             </a:fld>
             <a:endParaRPr lang="en-US"/>
           </a:p>
@@ -3942,7 +3942,7 @@
           <a:p>
             <a:fld id="{9BA68BF7-7197-B04D-ADD6-A4F729BF548A}" type="datetimeFigureOut">
               <a:rPr lang="en-US" smtClean="0"/>
-              <a:t>8/20/24</a:t>
+              <a:t>8/21/24</a:t>
             </a:fld>
             <a:endParaRPr lang="en-US"/>
           </a:p>
@@ -4037,7 +4037,7 @@
           <a:p>
             <a:fld id="{9BA68BF7-7197-B04D-ADD6-A4F729BF548A}" type="datetimeFigureOut">
               <a:rPr lang="en-US" smtClean="0"/>
-              <a:t>8/20/24</a:t>
+              <a:t>8/21/24</a:t>
             </a:fld>
             <a:endParaRPr lang="en-US"/>
           </a:p>
@@ -4800,7 +4800,7 @@
           <a:p>
             <a:fld id="{9BA68BF7-7197-B04D-ADD6-A4F729BF548A}" type="datetimeFigureOut">
               <a:rPr lang="en-US" smtClean="0"/>
-              <a:t>8/20/24</a:t>
+              <a:t>8/21/24</a:t>
             </a:fld>
             <a:endParaRPr lang="en-US"/>
           </a:p>
@@ -5640,7 +5640,7 @@
           <a:p>
             <a:fld id="{9BA68BF7-7197-B04D-ADD6-A4F729BF548A}" type="datetimeFigureOut">
               <a:rPr lang="en-US" smtClean="0"/>
-              <a:t>8/20/24</a:t>
+              <a:t>8/21/24</a:t>
             </a:fld>
             <a:endParaRPr lang="en-US"/>
           </a:p>
@@ -5866,7 +5866,7 @@
           <a:p>
             <a:fld id="{9BA68BF7-7197-B04D-ADD6-A4F729BF548A}" type="datetimeFigureOut">
               <a:rPr lang="en-US" smtClean="0"/>
-              <a:t>8/20/24</a:t>
+              <a:t>8/21/24</a:t>
             </a:fld>
             <a:endParaRPr lang="en-US"/>
           </a:p>
@@ -6935,7 +6935,7 @@
 </file>
 
 <file path=ppt/slides/slide10.xml><?xml version="1.0" encoding="utf-8"?>
-<p:sld xmlns:a="http://schemas.openxmlformats.org/drawingml/2006/main" xmlns:r="http://schemas.openxmlformats.org/officeDocument/2006/relationships" xmlns:p="http://schemas.openxmlformats.org/presentationml/2006/main" show="0">
+<p:sld xmlns:a="http://schemas.openxmlformats.org/drawingml/2006/main" xmlns:r="http://schemas.openxmlformats.org/officeDocument/2006/relationships" xmlns:p="http://schemas.openxmlformats.org/presentationml/2006/main">
   <p:cSld>
     <p:spTree>
       <p:nvGrpSpPr>
@@ -6953,10 +6953,10 @@
       </p:grpSpPr>
       <p:sp>
         <p:nvSpPr>
-          <p:cNvPr id="4" name="Title 3">
+          <p:cNvPr id="2" name="Title 1">
             <a:extLst>
               <a:ext uri="{FF2B5EF4-FFF2-40B4-BE49-F238E27FC236}">
-                <a16:creationId xmlns:a16="http://schemas.microsoft.com/office/drawing/2014/main" id="{B7D2D090-1BF7-48FA-0C70-6DA6737A0154}"/>
+                <a16:creationId xmlns:a16="http://schemas.microsoft.com/office/drawing/2014/main" id="{0B0CBCD3-FE40-CF38-B085-B5EEB8C3C41F}"/>
               </a:ext>
             </a:extLst>
           </p:cNvPr>
@@ -6974,17 +6974,17 @@
           <a:p>
             <a:r>
               <a:rPr lang="en-US" dirty="0"/>
-              <a:t>Activity Overview</a:t>
+              <a:t>Preparing your environment – I </a:t>
             </a:r>
           </a:p>
         </p:txBody>
       </p:sp>
       <p:sp>
         <p:nvSpPr>
-          <p:cNvPr id="5" name="Content Placeholder 4">
+          <p:cNvPr id="3" name="Content Placeholder 2">
             <a:extLst>
               <a:ext uri="{FF2B5EF4-FFF2-40B4-BE49-F238E27FC236}">
-                <a16:creationId xmlns:a16="http://schemas.microsoft.com/office/drawing/2014/main" id="{E1308F60-B859-86A9-DCAA-2366498002CA}"/>
+                <a16:creationId xmlns:a16="http://schemas.microsoft.com/office/drawing/2014/main" id="{56479A01-E04A-9D3E-EAF0-CF68FBC87BA3}"/>
               </a:ext>
             </a:extLst>
           </p:cNvPr>
@@ -6997,8 +6997,8 @@
         </p:nvSpPr>
         <p:spPr>
           <a:xfrm>
-            <a:off x="1251678" y="1874517"/>
-            <a:ext cx="9908409" cy="4601098"/>
+            <a:off x="1251678" y="2286001"/>
+            <a:ext cx="10178322" cy="4434288"/>
           </a:xfrm>
         </p:spPr>
         <p:txBody>
@@ -7009,80 +7009,113 @@
           <a:p>
             <a:r>
               <a:rPr lang="en-US" dirty="0"/>
-              <a:t>Launch Visual Studio Code (VSC). Through that app, you will download the activity files.</a:t>
-            </a:r>
-          </a:p>
-          <a:p>
+              <a:t>This part</a:t>
+            </a:r>
+            <a:r>
+              <a:rPr lang="en-US" u="sng" dirty="0"/>
+              <a:t> may already be done for you</a:t>
+            </a:r>
             <a:r>
               <a:rPr lang="en-US" dirty="0"/>
-              <a:t>Open the downloaded folder " SVP-LLM-Web". Open the Edge browser.</a:t>
-            </a:r>
-          </a:p>
-          <a:p>
+              <a:t>. But just in case:</a:t>
+            </a:r>
+          </a:p>
+          <a:p>
+            <a:pPr lvl="1"/>
             <a:r>
               <a:rPr lang="en-US" dirty="0"/>
-              <a:t>Drag the </a:t>
-            </a:r>
-            <a:r>
-              <a:rPr lang="en-US" i="1" dirty="0"/>
-              <a:t>index2 </a:t>
-            </a:r>
+              <a:t>To open Visual Studio Code (VSC) </a:t>
+            </a:r>
+          </a:p>
+          <a:p>
+            <a:pPr marL="1257300" lvl="2" indent="-342900">
+              <a:buFont typeface="+mj-lt"/>
+              <a:buAutoNum type="arabicPeriod"/>
+            </a:pPr>
+            <a:r>
+              <a:rPr lang="en-US" sz="1800" dirty="0"/>
+              <a:t>In the Windows search box in the task bar, enter “Visual Studio Code”</a:t>
+            </a:r>
+          </a:p>
+          <a:p>
+            <a:pPr marL="1257300" lvl="2" indent="-342900">
+              <a:buFont typeface="+mj-lt"/>
+              <a:buAutoNum type="arabicPeriod"/>
+            </a:pPr>
+            <a:r>
+              <a:rPr lang="en-US" sz="1800" dirty="0"/>
+              <a:t>In the pop-up, click on “open” in the right-hand column</a:t>
+            </a:r>
+          </a:p>
+          <a:p>
+            <a:pPr lvl="1"/>
             <a:r>
               <a:rPr lang="en-US" dirty="0"/>
-              <a:t>file from the SVP-LLM-Web folder into the browser window.</a:t>
-            </a:r>
-          </a:p>
-          <a:p>
+              <a:t>To open the Edge Browser:</a:t>
+            </a:r>
+          </a:p>
+          <a:p>
+            <a:pPr lvl="2"/>
+            <a:r>
+              <a:rPr lang="en-US" sz="1800" dirty="0"/>
+              <a:t>Click on the Edge app icon in the taskbar</a:t>
+            </a:r>
+          </a:p>
+          <a:p>
+            <a:pPr lvl="1"/>
             <a:r>
               <a:rPr lang="en-US" dirty="0"/>
-              <a:t>In VSC, click the </a:t>
-            </a:r>
-            <a:r>
-              <a:rPr lang="en-US" i="1" dirty="0"/>
-              <a:t>indexs.html</a:t>
-            </a:r>
-            <a:r>
-              <a:rPr lang="en-US" dirty="0"/>
-              <a:t> file in the left column. This is the markup 'code' for the page you see in the browser window.</a:t>
-            </a:r>
-          </a:p>
-          <a:p>
-            <a:r>
-              <a:rPr lang="en-US" dirty="0"/>
-              <a:t>What you see in the browser is a plain, "AI collaborator". You can give it a question and the AI will display an answer.  </a:t>
-            </a:r>
-            <a:r>
-              <a:rPr lang="en-US" i="1" dirty="0"/>
-              <a:t>Give that a try.</a:t>
-            </a:r>
+              <a:t>To position these two windows so you can work more efficiently:</a:t>
+            </a:r>
+          </a:p>
+          <a:p>
+            <a:pPr marL="1257300" lvl="2" indent="-342900">
+              <a:buFont typeface="+mj-lt"/>
+              <a:buAutoNum type="arabicPeriod"/>
+            </a:pPr>
+            <a:r>
+              <a:rPr lang="en-US" sz="1800" dirty="0"/>
+              <a:t>Select the VSC window and press the “Windows” and left-arrow keys at the same time; </a:t>
+            </a:r>
+            <a:br>
+              <a:rPr lang="en-US" sz="1800" dirty="0"/>
+            </a:br>
+            <a:r>
+              <a:rPr lang="en-US" sz="1800" dirty="0"/>
+              <a:t>the VSC window should move to the left side of your screen  </a:t>
+            </a:r>
+            <a:r>
+              <a:rPr lang="en-US" sz="1800" i="1" dirty="0"/>
+              <a:t>(you can release the keys)</a:t>
+            </a:r>
+            <a:endParaRPr lang="en-US" sz="1800" dirty="0"/>
+          </a:p>
+          <a:p>
+            <a:pPr marL="1257300" lvl="2" indent="-342900">
+              <a:buFont typeface="+mj-lt"/>
+              <a:buAutoNum type="arabicPeriod"/>
+            </a:pPr>
+            <a:r>
+              <a:rPr lang="en-US" sz="1800" dirty="0"/>
+              <a:t>Click on the Edge icon in the window that appears to the right; </a:t>
+            </a:r>
+            <a:br>
+              <a:rPr lang="en-US" sz="1800" dirty="0"/>
+            </a:br>
+            <a:r>
+              <a:rPr lang="en-US" sz="1800" dirty="0"/>
+              <a:t>the browser should fill the right side of the screen</a:t>
+            </a:r>
+          </a:p>
+          <a:p>
             <a:endParaRPr lang="en-US" dirty="0"/>
-          </a:p>
-          <a:p>
-            <a:r>
-              <a:rPr lang="en-US" dirty="0"/>
-              <a:t>You will begin with a simple page connected to an </a:t>
-            </a:r>
-            <a:r>
-              <a:rPr lang="en-US" i="1" dirty="0"/>
-              <a:t>AI collaborator</a:t>
-            </a:r>
-            <a:r>
-              <a:rPr lang="en-US" dirty="0"/>
-              <a:t> that prompts you to enter a query. That part works.</a:t>
-            </a:r>
-          </a:p>
-          <a:p>
-            <a:r>
-              <a:rPr lang="en-US" dirty="0"/>
-              <a:t>The web page is rather gray and boring. So, let's try to "enhance it" - with RIT colors!</a:t>
-            </a:r>
           </a:p>
         </p:txBody>
       </p:sp>
     </p:spTree>
     <p:extLst>
       <p:ext uri="{BB962C8B-B14F-4D97-AF65-F5344CB8AC3E}">
-        <p14:creationId xmlns:p14="http://schemas.microsoft.com/office/powerpoint/2010/main" val="2533179280"/>
+        <p14:creationId xmlns:p14="http://schemas.microsoft.com/office/powerpoint/2010/main" val="2086605868"/>
       </p:ext>
     </p:extLst>
   </p:cSld>
@@ -7132,197 +7165,6 @@
           <a:p>
             <a:r>
               <a:rPr lang="en-US" dirty="0"/>
-              <a:t>Preparing your environment – I </a:t>
-            </a:r>
-          </a:p>
-        </p:txBody>
-      </p:sp>
-      <p:sp>
-        <p:nvSpPr>
-          <p:cNvPr id="3" name="Content Placeholder 2">
-            <a:extLst>
-              <a:ext uri="{FF2B5EF4-FFF2-40B4-BE49-F238E27FC236}">
-                <a16:creationId xmlns:a16="http://schemas.microsoft.com/office/drawing/2014/main" id="{56479A01-E04A-9D3E-EAF0-CF68FBC87BA3}"/>
-              </a:ext>
-            </a:extLst>
-          </p:cNvPr>
-          <p:cNvSpPr>
-            <a:spLocks noGrp="1"/>
-          </p:cNvSpPr>
-          <p:nvPr>
-            <p:ph idx="1"/>
-          </p:nvPr>
-        </p:nvSpPr>
-        <p:spPr>
-          <a:xfrm>
-            <a:off x="1251678" y="2286001"/>
-            <a:ext cx="10178322" cy="4434288"/>
-          </a:xfrm>
-        </p:spPr>
-        <p:txBody>
-          <a:bodyPr>
-            <a:normAutofit/>
-          </a:bodyPr>
-          <a:lstStyle/>
-          <a:p>
-            <a:r>
-              <a:rPr lang="en-US" dirty="0"/>
-              <a:t>This part</a:t>
-            </a:r>
-            <a:r>
-              <a:rPr lang="en-US" u="sng" dirty="0"/>
-              <a:t> may already be done for you</a:t>
-            </a:r>
-            <a:r>
-              <a:rPr lang="en-US" dirty="0"/>
-              <a:t>. But just in case:</a:t>
-            </a:r>
-          </a:p>
-          <a:p>
-            <a:pPr lvl="1"/>
-            <a:r>
-              <a:rPr lang="en-US" dirty="0"/>
-              <a:t>To open Visual Studio Code (VSC) </a:t>
-            </a:r>
-          </a:p>
-          <a:p>
-            <a:pPr marL="1257300" lvl="2" indent="-342900">
-              <a:buFont typeface="+mj-lt"/>
-              <a:buAutoNum type="arabicPeriod"/>
-            </a:pPr>
-            <a:r>
-              <a:rPr lang="en-US" sz="1800" dirty="0"/>
-              <a:t>In the Windows search box in the task bar, enter “Visual Studio Code”</a:t>
-            </a:r>
-          </a:p>
-          <a:p>
-            <a:pPr marL="1257300" lvl="2" indent="-342900">
-              <a:buFont typeface="+mj-lt"/>
-              <a:buAutoNum type="arabicPeriod"/>
-            </a:pPr>
-            <a:r>
-              <a:rPr lang="en-US" sz="1800" dirty="0"/>
-              <a:t>In the pop-up, click on “open” in the right-hand column</a:t>
-            </a:r>
-          </a:p>
-          <a:p>
-            <a:pPr lvl="1"/>
-            <a:r>
-              <a:rPr lang="en-US" dirty="0"/>
-              <a:t>To open the Edge Browser:</a:t>
-            </a:r>
-          </a:p>
-          <a:p>
-            <a:pPr lvl="2"/>
-            <a:r>
-              <a:rPr lang="en-US" sz="1800" dirty="0"/>
-              <a:t>Click on the Edge app icon in the taskbar</a:t>
-            </a:r>
-          </a:p>
-          <a:p>
-            <a:pPr lvl="1"/>
-            <a:r>
-              <a:rPr lang="en-US" dirty="0"/>
-              <a:t>To position these two windows so you can work more efficiently:</a:t>
-            </a:r>
-          </a:p>
-          <a:p>
-            <a:pPr marL="1257300" lvl="2" indent="-342900">
-              <a:buFont typeface="+mj-lt"/>
-              <a:buAutoNum type="arabicPeriod"/>
-            </a:pPr>
-            <a:r>
-              <a:rPr lang="en-US" sz="1800" dirty="0"/>
-              <a:t>Select the VSC window and press the “Windows” and left-arrow keys at the same time; </a:t>
-            </a:r>
-            <a:br>
-              <a:rPr lang="en-US" sz="1800" dirty="0"/>
-            </a:br>
-            <a:r>
-              <a:rPr lang="en-US" sz="1800" dirty="0"/>
-              <a:t>the VSC window should move to the left side of your screen  </a:t>
-            </a:r>
-            <a:r>
-              <a:rPr lang="en-US" sz="1800" i="1" dirty="0"/>
-              <a:t>(you can release the keys)</a:t>
-            </a:r>
-            <a:endParaRPr lang="en-US" sz="1800" dirty="0"/>
-          </a:p>
-          <a:p>
-            <a:pPr marL="1257300" lvl="2" indent="-342900">
-              <a:buFont typeface="+mj-lt"/>
-              <a:buAutoNum type="arabicPeriod"/>
-            </a:pPr>
-            <a:r>
-              <a:rPr lang="en-US" sz="1800" dirty="0"/>
-              <a:t>Click on the Edge icon in the window that appears to the right; </a:t>
-            </a:r>
-            <a:br>
-              <a:rPr lang="en-US" sz="1800" dirty="0"/>
-            </a:br>
-            <a:r>
-              <a:rPr lang="en-US" sz="1800" dirty="0"/>
-              <a:t>the browser should fill the right side of the screen</a:t>
-            </a:r>
-          </a:p>
-          <a:p>
-            <a:endParaRPr lang="en-US" dirty="0"/>
-          </a:p>
-        </p:txBody>
-      </p:sp>
-    </p:spTree>
-    <p:extLst>
-      <p:ext uri="{BB962C8B-B14F-4D97-AF65-F5344CB8AC3E}">
-        <p14:creationId xmlns:p14="http://schemas.microsoft.com/office/powerpoint/2010/main" val="2086605868"/>
-      </p:ext>
-    </p:extLst>
-  </p:cSld>
-  <p:clrMapOvr>
-    <a:masterClrMapping/>
-  </p:clrMapOvr>
-</p:sld>
-</file>
-
-<file path=ppt/slides/slide12.xml><?xml version="1.0" encoding="utf-8"?>
-<p:sld xmlns:a="http://schemas.openxmlformats.org/drawingml/2006/main" xmlns:r="http://schemas.openxmlformats.org/officeDocument/2006/relationships" xmlns:p="http://schemas.openxmlformats.org/presentationml/2006/main">
-  <p:cSld>
-    <p:spTree>
-      <p:nvGrpSpPr>
-        <p:cNvPr id="1" name=""/>
-        <p:cNvGrpSpPr/>
-        <p:nvPr/>
-      </p:nvGrpSpPr>
-      <p:grpSpPr>
-        <a:xfrm>
-          <a:off x="0" y="0"/>
-          <a:ext cx="0" cy="0"/>
-          <a:chOff x="0" y="0"/>
-          <a:chExt cx="0" cy="0"/>
-        </a:xfrm>
-      </p:grpSpPr>
-      <p:sp>
-        <p:nvSpPr>
-          <p:cNvPr id="2" name="Title 1">
-            <a:extLst>
-              <a:ext uri="{FF2B5EF4-FFF2-40B4-BE49-F238E27FC236}">
-                <a16:creationId xmlns:a16="http://schemas.microsoft.com/office/drawing/2014/main" id="{0B0CBCD3-FE40-CF38-B085-B5EEB8C3C41F}"/>
-              </a:ext>
-            </a:extLst>
-          </p:cNvPr>
-          <p:cNvSpPr>
-            <a:spLocks noGrp="1"/>
-          </p:cNvSpPr>
-          <p:nvPr>
-            <p:ph type="title"/>
-          </p:nvPr>
-        </p:nvSpPr>
-        <p:spPr/>
-        <p:txBody>
-          <a:bodyPr/>
-          <a:lstStyle/>
-          <a:p>
-            <a:r>
-              <a:rPr lang="en-US" dirty="0"/>
               <a:t>Preparing your environment – II </a:t>
             </a:r>
           </a:p>
@@ -7469,21 +7311,8 @@
             </a:r>
             <a:r>
               <a:rPr lang="en-US" i="1" dirty="0"/>
-              <a:t>next page</a:t>
-            </a:r>
-          </a:p>
-          <a:p>
-            <a:r>
-              <a:rPr lang="en-US" dirty="0"/>
-              <a:t>Everything is in place!  </a:t>
-            </a:r>
-            <a:r>
-              <a:rPr lang="en-US" b="1" i="1" dirty="0"/>
-              <a:t>Let’s move on!!!</a:t>
-            </a:r>
-          </a:p>
-          <a:p>
-            <a:endParaRPr lang="en-US" dirty="0"/>
+              <a:t>next page...</a:t>
+            </a:r>
           </a:p>
         </p:txBody>
       </p:sp>
@@ -7491,6 +7320,104 @@
     <p:extLst>
       <p:ext uri="{BB962C8B-B14F-4D97-AF65-F5344CB8AC3E}">
         <p14:creationId xmlns:p14="http://schemas.microsoft.com/office/powerpoint/2010/main" val="2945417786"/>
+      </p:ext>
+    </p:extLst>
+  </p:cSld>
+  <p:clrMapOvr>
+    <a:masterClrMapping/>
+  </p:clrMapOvr>
+</p:sld>
+</file>
+
+<file path=ppt/slides/slide12.xml><?xml version="1.0" encoding="utf-8"?>
+<p:sld xmlns:a="http://schemas.openxmlformats.org/drawingml/2006/main" xmlns:r="http://schemas.openxmlformats.org/officeDocument/2006/relationships" xmlns:p="http://schemas.openxmlformats.org/presentationml/2006/main">
+  <p:cSld>
+    <p:spTree>
+      <p:nvGrpSpPr>
+        <p:cNvPr id="1" name=""/>
+        <p:cNvGrpSpPr/>
+        <p:nvPr/>
+      </p:nvGrpSpPr>
+      <p:grpSpPr>
+        <a:xfrm>
+          <a:off x="0" y="0"/>
+          <a:ext cx="0" cy="0"/>
+          <a:chOff x="0" y="0"/>
+          <a:chExt cx="0" cy="0"/>
+        </a:xfrm>
+      </p:grpSpPr>
+      <p:pic>
+        <p:nvPicPr>
+          <p:cNvPr id="9" name="Picture 8">
+            <a:extLst>
+              <a:ext uri="{FF2B5EF4-FFF2-40B4-BE49-F238E27FC236}">
+                <a16:creationId xmlns:a16="http://schemas.microsoft.com/office/drawing/2014/main" id="{13B6AF7C-92E7-D4A3-C441-E720FD310374}"/>
+              </a:ext>
+            </a:extLst>
+          </p:cNvPr>
+          <p:cNvPicPr>
+            <a:picLocks noChangeAspect="1"/>
+          </p:cNvPicPr>
+          <p:nvPr/>
+        </p:nvPicPr>
+        <p:blipFill>
+          <a:blip r:embed="rId2"/>
+          <a:stretch>
+            <a:fillRect/>
+          </a:stretch>
+        </p:blipFill>
+        <p:spPr>
+          <a:xfrm>
+            <a:off x="1273919" y="489622"/>
+            <a:ext cx="10146090" cy="5457970"/>
+          </a:xfrm>
+          <a:prstGeom prst="rect">
+            <a:avLst/>
+          </a:prstGeom>
+        </p:spPr>
+      </p:pic>
+      <p:sp>
+        <p:nvSpPr>
+          <p:cNvPr id="2" name="TextBox 1">
+            <a:extLst>
+              <a:ext uri="{FF2B5EF4-FFF2-40B4-BE49-F238E27FC236}">
+                <a16:creationId xmlns:a16="http://schemas.microsoft.com/office/drawing/2014/main" id="{D08C884D-F701-DB00-0065-873C8F2EE8A1}"/>
+              </a:ext>
+            </a:extLst>
+          </p:cNvPr>
+          <p:cNvSpPr txBox="1"/>
+          <p:nvPr/>
+        </p:nvSpPr>
+        <p:spPr>
+          <a:xfrm>
+            <a:off x="3074973" y="6133763"/>
+            <a:ext cx="6247052" cy="400110"/>
+          </a:xfrm>
+          <a:prstGeom prst="rect">
+            <a:avLst/>
+          </a:prstGeom>
+          <a:noFill/>
+        </p:spPr>
+        <p:txBody>
+          <a:bodyPr wrap="square" rtlCol="0">
+            <a:spAutoFit/>
+          </a:bodyPr>
+          <a:lstStyle/>
+          <a:p>
+            <a:pPr algn="ctr"/>
+            <a:r>
+              <a:rPr lang="en-US" sz="2000" dirty="0">
+                <a:latin typeface="Corbel" panose="020B0503020204020204" pitchFamily="34" charset="0"/>
+              </a:rPr>
+              <a:t>One more preparation step...</a:t>
+            </a:r>
+          </a:p>
+        </p:txBody>
+      </p:sp>
+    </p:spTree>
+    <p:extLst>
+      <p:ext uri="{BB962C8B-B14F-4D97-AF65-F5344CB8AC3E}">
+        <p14:creationId xmlns:p14="http://schemas.microsoft.com/office/powerpoint/2010/main" val="3391911961"/>
       </p:ext>
     </p:extLst>
   </p:cSld>
@@ -7569,20 +7496,9 @@
         </p:spPr>
         <p:txBody>
           <a:bodyPr>
-            <a:normAutofit lnSpcReduction="10000"/>
+            <a:normAutofit/>
           </a:bodyPr>
           <a:lstStyle/>
-          <a:p>
-            <a:r>
-              <a:rPr lang="en-US" dirty="0"/>
-              <a:t>Your screen should now look like the image on the </a:t>
-            </a:r>
-            <a:r>
-              <a:rPr lang="en-US" i="1" dirty="0"/>
-              <a:t>next page.</a:t>
-            </a:r>
-            <a:endParaRPr lang="en-US" dirty="0"/>
-          </a:p>
           <a:p>
             <a:r>
               <a:rPr lang="en-US" dirty="0"/>
@@ -7689,18 +7605,23 @@
             <a:endParaRPr lang="en-US" dirty="0"/>
           </a:p>
           <a:p>
-            <a:pPr>
+            <a:pPr marL="0" indent="0" algn="ctr">
               <a:spcBef>
                 <a:spcPts val="1500"/>
               </a:spcBef>
+              <a:buNone/>
             </a:pPr>
             <a:r>
+              <a:rPr lang="en-US" b="1" dirty="0"/>
+              <a:t>Everything is in place! </a:t>
+            </a:r>
+            <a:r>
               <a:rPr lang="en-US" dirty="0"/>
-              <a:t>Everything is in place!  </a:t>
+              <a:t> </a:t>
             </a:r>
             <a:r>
               <a:rPr lang="en-US" b="1" i="1" dirty="0"/>
-              <a:t>Let’s move on!!!</a:t>
+              <a:t>Let’s make some page changes!!!</a:t>
             </a:r>
           </a:p>
         </p:txBody>
@@ -7719,66 +7640,6 @@
 </file>
 
 <file path=ppt/slides/slide14.xml><?xml version="1.0" encoding="utf-8"?>
-<p:sld xmlns:a="http://schemas.openxmlformats.org/drawingml/2006/main" xmlns:r="http://schemas.openxmlformats.org/officeDocument/2006/relationships" xmlns:p="http://schemas.openxmlformats.org/presentationml/2006/main">
-  <p:cSld>
-    <p:spTree>
-      <p:nvGrpSpPr>
-        <p:cNvPr id="1" name=""/>
-        <p:cNvGrpSpPr/>
-        <p:nvPr/>
-      </p:nvGrpSpPr>
-      <p:grpSpPr>
-        <a:xfrm>
-          <a:off x="0" y="0"/>
-          <a:ext cx="0" cy="0"/>
-          <a:chOff x="0" y="0"/>
-          <a:chExt cx="0" cy="0"/>
-        </a:xfrm>
-      </p:grpSpPr>
-      <p:pic>
-        <p:nvPicPr>
-          <p:cNvPr id="9" name="Picture 8">
-            <a:extLst>
-              <a:ext uri="{FF2B5EF4-FFF2-40B4-BE49-F238E27FC236}">
-                <a16:creationId xmlns:a16="http://schemas.microsoft.com/office/drawing/2014/main" id="{13B6AF7C-92E7-D4A3-C441-E720FD310374}"/>
-              </a:ext>
-            </a:extLst>
-          </p:cNvPr>
-          <p:cNvPicPr>
-            <a:picLocks noChangeAspect="1"/>
-          </p:cNvPicPr>
-          <p:nvPr/>
-        </p:nvPicPr>
-        <p:blipFill>
-          <a:blip r:embed="rId2"/>
-          <a:stretch>
-            <a:fillRect/>
-          </a:stretch>
-        </p:blipFill>
-        <p:spPr>
-          <a:xfrm>
-            <a:off x="1306287" y="700015"/>
-            <a:ext cx="10146090" cy="5457970"/>
-          </a:xfrm>
-          <a:prstGeom prst="rect">
-            <a:avLst/>
-          </a:prstGeom>
-        </p:spPr>
-      </p:pic>
-    </p:spTree>
-    <p:extLst>
-      <p:ext uri="{BB962C8B-B14F-4D97-AF65-F5344CB8AC3E}">
-        <p14:creationId xmlns:p14="http://schemas.microsoft.com/office/powerpoint/2010/main" val="3391911961"/>
-      </p:ext>
-    </p:extLst>
-  </p:cSld>
-  <p:clrMapOvr>
-    <a:masterClrMapping/>
-  </p:clrMapOvr>
-</p:sld>
-</file>
-
-<file path=ppt/slides/slide15.xml><?xml version="1.0" encoding="utf-8"?>
 <p:sld xmlns:a="http://schemas.openxmlformats.org/drawingml/2006/main" xmlns:r="http://schemas.openxmlformats.org/officeDocument/2006/relationships" xmlns:p="http://schemas.openxmlformats.org/presentationml/2006/main">
   <p:cSld>
     <p:spTree>
@@ -7918,7 +7779,7 @@
                 <a:ea typeface="Menlo" panose="020B0609030804020204" pitchFamily="49" charset="0"/>
                 <a:cs typeface="Menlo" panose="020B0609030804020204" pitchFamily="49" charset="0"/>
               </a:rPr>
-              <a:t>&lt;div id="instruction" class="border"&gt;</a:t>
+              <a:t>&lt;div id="instruction"&gt;</a:t>
             </a:r>
           </a:p>
           <a:p>
@@ -8118,7 +7979,7 @@
 </p:sld>
 </file>
 
-<file path=ppt/slides/slide16.xml><?xml version="1.0" encoding="utf-8"?>
+<file path=ppt/slides/slide15.xml><?xml version="1.0" encoding="utf-8"?>
 <p:sld xmlns:a="http://schemas.openxmlformats.org/drawingml/2006/main" xmlns:r="http://schemas.openxmlformats.org/officeDocument/2006/relationships" xmlns:p="http://schemas.openxmlformats.org/presentationml/2006/main">
   <p:cSld>
     <p:spTree>
@@ -8519,7 +8380,7 @@
 </p:sld>
 </file>
 
-<file path=ppt/slides/slide17.xml><?xml version="1.0" encoding="utf-8"?>
+<file path=ppt/slides/slide16.xml><?xml version="1.0" encoding="utf-8"?>
 <p:sld xmlns:a="http://schemas.openxmlformats.org/drawingml/2006/main" xmlns:r="http://schemas.openxmlformats.org/officeDocument/2006/relationships" xmlns:p="http://schemas.openxmlformats.org/presentationml/2006/main">
   <p:cSld>
     <p:spTree>
@@ -8858,7 +8719,7 @@
 </p:sld>
 </file>
 
-<file path=ppt/slides/slide18.xml><?xml version="1.0" encoding="utf-8"?>
+<file path=ppt/slides/slide17.xml><?xml version="1.0" encoding="utf-8"?>
 <p:sld xmlns:a="http://schemas.openxmlformats.org/drawingml/2006/main" xmlns:r="http://schemas.openxmlformats.org/officeDocument/2006/relationships" xmlns:p="http://schemas.openxmlformats.org/presentationml/2006/main">
   <p:cSld>
     <p:spTree>
@@ -9843,6 +9704,221 @@
 </p:sld>
 </file>
 
+<file path=ppt/slides/slide18.xml><?xml version="1.0" encoding="utf-8"?>
+<p:sld xmlns:a="http://schemas.openxmlformats.org/drawingml/2006/main" xmlns:r="http://schemas.openxmlformats.org/officeDocument/2006/relationships" xmlns:p="http://schemas.openxmlformats.org/presentationml/2006/main">
+  <p:cSld>
+    <p:spTree>
+      <p:nvGrpSpPr>
+        <p:cNvPr id="1" name=""/>
+        <p:cNvGrpSpPr/>
+        <p:nvPr/>
+      </p:nvGrpSpPr>
+      <p:grpSpPr>
+        <a:xfrm>
+          <a:off x="0" y="0"/>
+          <a:ext cx="0" cy="0"/>
+          <a:chOff x="0" y="0"/>
+          <a:chExt cx="0" cy="0"/>
+        </a:xfrm>
+      </p:grpSpPr>
+      <p:sp>
+        <p:nvSpPr>
+          <p:cNvPr id="2" name="Title 1">
+            <a:extLst>
+              <a:ext uri="{FF2B5EF4-FFF2-40B4-BE49-F238E27FC236}">
+                <a16:creationId xmlns:a16="http://schemas.microsoft.com/office/drawing/2014/main" id="{10EA01F3-F16B-629E-E754-47034C3EBB09}"/>
+              </a:ext>
+            </a:extLst>
+          </p:cNvPr>
+          <p:cNvSpPr>
+            <a:spLocks noGrp="1"/>
+          </p:cNvSpPr>
+          <p:nvPr>
+            <p:ph type="title"/>
+          </p:nvPr>
+        </p:nvSpPr>
+        <p:spPr>
+          <a:xfrm>
+            <a:off x="1251678" y="382385"/>
+            <a:ext cx="10178322" cy="928622"/>
+          </a:xfrm>
+        </p:spPr>
+        <p:txBody>
+          <a:bodyPr/>
+          <a:lstStyle/>
+          <a:p>
+            <a:r>
+              <a:rPr lang="en-US" dirty="0"/>
+              <a:t>Working In CSS</a:t>
+            </a:r>
+          </a:p>
+        </p:txBody>
+      </p:sp>
+      <p:sp>
+        <p:nvSpPr>
+          <p:cNvPr id="3" name="Content Placeholder 2">
+            <a:extLst>
+              <a:ext uri="{FF2B5EF4-FFF2-40B4-BE49-F238E27FC236}">
+                <a16:creationId xmlns:a16="http://schemas.microsoft.com/office/drawing/2014/main" id="{77415AFB-FBD4-2DE3-F2D3-5EA0B4B66C30}"/>
+              </a:ext>
+            </a:extLst>
+          </p:cNvPr>
+          <p:cNvSpPr>
+            <a:spLocks noGrp="1"/>
+          </p:cNvSpPr>
+          <p:nvPr>
+            <p:ph idx="1"/>
+          </p:nvPr>
+        </p:nvSpPr>
+        <p:spPr>
+          <a:xfrm>
+            <a:off x="1251678" y="1311007"/>
+            <a:ext cx="5211751" cy="5277080"/>
+          </a:xfrm>
+        </p:spPr>
+        <p:txBody>
+          <a:bodyPr>
+            <a:normAutofit/>
+          </a:bodyPr>
+          <a:lstStyle/>
+          <a:p>
+            <a:pPr marL="0" indent="0">
+              <a:buNone/>
+            </a:pPr>
+            <a:r>
+              <a:rPr lang="en-US" dirty="0"/>
+              <a:t>Let's make some changing in CSS, to experience its power.</a:t>
+            </a:r>
+          </a:p>
+          <a:p>
+            <a:r>
+              <a:rPr lang="en-US" dirty="0"/>
+              <a:t>In the SVP-LLM-Web folder, locate the </a:t>
+            </a:r>
+            <a:r>
+              <a:rPr lang="en-US" b="1" dirty="0" err="1"/>
+              <a:t>svpcss.css</a:t>
+            </a:r>
+            <a:r>
+              <a:rPr lang="en-US" dirty="0"/>
+              <a:t> file. Drag the file icon </a:t>
+            </a:r>
+            <a:r>
+              <a:rPr lang="en-US" i="1" dirty="0"/>
+              <a:t>next</a:t>
+            </a:r>
+            <a:r>
+              <a:rPr lang="en-US" dirty="0"/>
+              <a:t> to </a:t>
+            </a:r>
+            <a:br>
+              <a:rPr lang="en-US" dirty="0"/>
+            </a:br>
+            <a:r>
+              <a:rPr lang="en-US" dirty="0"/>
+              <a:t>the tab with </a:t>
+            </a:r>
+            <a:r>
+              <a:rPr lang="en-US" dirty="0" err="1"/>
+              <a:t>index.html</a:t>
+            </a:r>
+            <a:r>
+              <a:rPr lang="en-US" dirty="0"/>
+              <a:t>, and release.</a:t>
+            </a:r>
+            <a:br>
+              <a:rPr lang="en-US" dirty="0"/>
+            </a:br>
+            <a:r>
+              <a:rPr lang="en-US" i="1" dirty="0"/>
+              <a:t>You should be looking at CSS code...</a:t>
+            </a:r>
+            <a:endParaRPr lang="en-US" dirty="0"/>
+          </a:p>
+          <a:p>
+            <a:pPr marL="0" indent="0">
+              <a:buNone/>
+            </a:pPr>
+            <a:endParaRPr lang="en-US" dirty="0"/>
+          </a:p>
+          <a:p>
+            <a:pPr indent="0">
+              <a:buNone/>
+            </a:pPr>
+            <a:r>
+              <a:rPr lang="en-US" dirty="0"/>
+              <a:t>We will next work on improving the instruction box in a variety of ways. </a:t>
+            </a:r>
+            <a:endParaRPr lang="en-US" sz="1400" dirty="0">
+              <a:latin typeface="Menlo" panose="020B0609030804020204" pitchFamily="49" charset="0"/>
+              <a:ea typeface="Menlo" panose="020B0609030804020204" pitchFamily="49" charset="0"/>
+              <a:cs typeface="Menlo" panose="020B0609030804020204" pitchFamily="49" charset="0"/>
+            </a:endParaRPr>
+          </a:p>
+          <a:p>
+            <a:pPr marL="457200" lvl="1" indent="0">
+              <a:buNone/>
+            </a:pPr>
+            <a:endParaRPr lang="en-US" sz="1400" dirty="0">
+              <a:latin typeface="Menlo" panose="020B0609030804020204" pitchFamily="49" charset="0"/>
+              <a:ea typeface="Menlo" panose="020B0609030804020204" pitchFamily="49" charset="0"/>
+              <a:cs typeface="Menlo" panose="020B0609030804020204" pitchFamily="49" charset="0"/>
+            </a:endParaRPr>
+          </a:p>
+          <a:p>
+            <a:pPr marL="457200" lvl="1" indent="0">
+              <a:buNone/>
+            </a:pPr>
+            <a:endParaRPr lang="en-US" sz="1400" dirty="0">
+              <a:latin typeface="Menlo" panose="020B0609030804020204" pitchFamily="49" charset="0"/>
+              <a:ea typeface="Menlo" panose="020B0609030804020204" pitchFamily="49" charset="0"/>
+              <a:cs typeface="Menlo" panose="020B0609030804020204" pitchFamily="49" charset="0"/>
+            </a:endParaRPr>
+          </a:p>
+        </p:txBody>
+      </p:sp>
+      <p:pic>
+        <p:nvPicPr>
+          <p:cNvPr id="4" name="Picture 3">
+            <a:extLst>
+              <a:ext uri="{FF2B5EF4-FFF2-40B4-BE49-F238E27FC236}">
+                <a16:creationId xmlns:a16="http://schemas.microsoft.com/office/drawing/2014/main" id="{C6103B6A-FF13-76C1-638A-C2287B74436B}"/>
+              </a:ext>
+            </a:extLst>
+          </p:cNvPr>
+          <p:cNvPicPr>
+            <a:picLocks noChangeAspect="1"/>
+          </p:cNvPicPr>
+          <p:nvPr/>
+        </p:nvPicPr>
+        <p:blipFill>
+          <a:blip r:embed="rId2"/>
+          <a:srcRect l="16147" t="41481" r="14903"/>
+          <a:stretch/>
+        </p:blipFill>
+        <p:spPr>
+          <a:xfrm>
+            <a:off x="6664529" y="1689100"/>
+            <a:ext cx="5113994" cy="4013200"/>
+          </a:xfrm>
+          <a:prstGeom prst="rect">
+            <a:avLst/>
+          </a:prstGeom>
+        </p:spPr>
+      </p:pic>
+    </p:spTree>
+    <p:extLst>
+      <p:ext uri="{BB962C8B-B14F-4D97-AF65-F5344CB8AC3E}">
+        <p14:creationId xmlns:p14="http://schemas.microsoft.com/office/powerpoint/2010/main" val="2103626714"/>
+      </p:ext>
+    </p:extLst>
+  </p:cSld>
+  <p:clrMapOvr>
+    <a:masterClrMapping/>
+  </p:clrMapOvr>
+</p:sld>
+</file>
+
 <file path=ppt/slides/slide19.xml><?xml version="1.0" encoding="utf-8"?>
 <p:sld xmlns:a="http://schemas.openxmlformats.org/drawingml/2006/main" xmlns:r="http://schemas.openxmlformats.org/officeDocument/2006/relationships" xmlns:p="http://schemas.openxmlformats.org/presentationml/2006/main">
   <p:cSld>
@@ -9888,7 +9964,7 @@
           <a:p>
             <a:r>
               <a:rPr lang="en-US" dirty="0"/>
-              <a:t>Working In CSS</a:t>
+              <a:t>Task 4 - In CSS</a:t>
             </a:r>
           </a:p>
         </p:txBody>
@@ -9912,7 +9988,7 @@
         <p:spPr>
           <a:xfrm>
             <a:off x="1251678" y="1311007"/>
-            <a:ext cx="5211751" cy="5277080"/>
+            <a:ext cx="5898422" cy="5277080"/>
           </a:xfrm>
         </p:spPr>
         <p:txBody>
@@ -9921,73 +9997,260 @@
           </a:bodyPr>
           <a:lstStyle/>
           <a:p>
+            <a:pPr marL="457200" indent="-457200">
+              <a:buFont typeface="+mj-lt"/>
+              <a:buAutoNum type="arabicPeriod" startAt="6"/>
+            </a:pPr>
+            <a:r>
+              <a:rPr lang="en-US" dirty="0"/>
+              <a:t>Search for "Task 4". Below the comment is the ID instruction (block) rule. Change the lines of CSS between the { } brackets to what is shown below:</a:t>
+            </a:r>
+          </a:p>
+          <a:p>
+            <a:pPr marL="460375" indent="0">
+              <a:spcBef>
+                <a:spcPts val="0"/>
+              </a:spcBef>
+              <a:buNone/>
+            </a:pPr>
+            <a:r>
+              <a:rPr lang="en-US" sz="1800" dirty="0">
+                <a:solidFill>
+                  <a:srgbClr val="0070C0"/>
+                </a:solidFill>
+                <a:latin typeface="Menlo" panose="020B0609030804020204" pitchFamily="49" charset="0"/>
+                <a:ea typeface="Menlo" panose="020B0609030804020204" pitchFamily="49" charset="0"/>
+                <a:cs typeface="Menlo" panose="020B0609030804020204" pitchFamily="49" charset="0"/>
+              </a:rPr>
+              <a:t>margin-inline: auto;</a:t>
+            </a:r>
+          </a:p>
+          <a:p>
+            <a:pPr marL="460375" indent="0">
+              <a:spcBef>
+                <a:spcPts val="0"/>
+              </a:spcBef>
+              <a:buNone/>
+            </a:pPr>
+            <a:r>
+              <a:rPr lang="en-US" sz="1800" dirty="0">
+                <a:solidFill>
+                  <a:srgbClr val="0070C0"/>
+                </a:solidFill>
+                <a:latin typeface="Menlo" panose="020B0609030804020204" pitchFamily="49" charset="0"/>
+                <a:ea typeface="Menlo" panose="020B0609030804020204" pitchFamily="49" charset="0"/>
+                <a:cs typeface="Menlo" panose="020B0609030804020204" pitchFamily="49" charset="0"/>
+              </a:rPr>
+              <a:t>width: 50%;</a:t>
+            </a:r>
+          </a:p>
+          <a:p>
+            <a:pPr marL="460375" indent="0">
+              <a:spcBef>
+                <a:spcPts val="0"/>
+              </a:spcBef>
+              <a:buNone/>
+            </a:pPr>
+            <a:r>
+              <a:rPr lang="en-US" sz="1800" dirty="0">
+                <a:solidFill>
+                  <a:srgbClr val="0070C0"/>
+                </a:solidFill>
+                <a:latin typeface="Menlo" panose="020B0609030804020204" pitchFamily="49" charset="0"/>
+                <a:ea typeface="Menlo" panose="020B0609030804020204" pitchFamily="49" charset="0"/>
+                <a:cs typeface="Menlo" panose="020B0609030804020204" pitchFamily="49" charset="0"/>
+              </a:rPr>
+              <a:t>background-color: var(--</a:t>
+            </a:r>
+            <a:r>
+              <a:rPr lang="en-US" sz="1800" dirty="0" err="1">
+                <a:solidFill>
+                  <a:srgbClr val="0070C0"/>
+                </a:solidFill>
+                <a:latin typeface="Menlo" panose="020B0609030804020204" pitchFamily="49" charset="0"/>
+                <a:ea typeface="Menlo" panose="020B0609030804020204" pitchFamily="49" charset="0"/>
+                <a:cs typeface="Menlo" panose="020B0609030804020204" pitchFamily="49" charset="0"/>
+              </a:rPr>
+              <a:t>rit-accgreen</a:t>
+            </a:r>
+            <a:r>
+              <a:rPr lang="en-US" sz="1800" dirty="0">
+                <a:solidFill>
+                  <a:srgbClr val="0070C0"/>
+                </a:solidFill>
+                <a:latin typeface="Menlo" panose="020B0609030804020204" pitchFamily="49" charset="0"/>
+                <a:ea typeface="Menlo" panose="020B0609030804020204" pitchFamily="49" charset="0"/>
+                <a:cs typeface="Menlo" panose="020B0609030804020204" pitchFamily="49" charset="0"/>
+              </a:rPr>
+              <a:t>);</a:t>
+            </a:r>
+          </a:p>
+          <a:p>
+            <a:pPr marL="460375" indent="0">
+              <a:spcBef>
+                <a:spcPts val="0"/>
+              </a:spcBef>
+              <a:buNone/>
+            </a:pPr>
+            <a:r>
+              <a:rPr lang="en-US" sz="1800" dirty="0" err="1">
+                <a:solidFill>
+                  <a:srgbClr val="0070C0"/>
+                </a:solidFill>
+                <a:latin typeface="Menlo" panose="020B0609030804020204" pitchFamily="49" charset="0"/>
+                <a:ea typeface="Menlo" panose="020B0609030804020204" pitchFamily="49" charset="0"/>
+                <a:cs typeface="Menlo" panose="020B0609030804020204" pitchFamily="49" charset="0"/>
+              </a:rPr>
+              <a:t>color:white</a:t>
+            </a:r>
+            <a:r>
+              <a:rPr lang="en-US" sz="1800" dirty="0">
+                <a:solidFill>
+                  <a:srgbClr val="0070C0"/>
+                </a:solidFill>
+                <a:latin typeface="Menlo" panose="020B0609030804020204" pitchFamily="49" charset="0"/>
+                <a:ea typeface="Menlo" panose="020B0609030804020204" pitchFamily="49" charset="0"/>
+                <a:cs typeface="Menlo" panose="020B0609030804020204" pitchFamily="49" charset="0"/>
+              </a:rPr>
+              <a:t>;</a:t>
+            </a:r>
+          </a:p>
+          <a:p>
+            <a:pPr marL="460375" indent="0">
+              <a:spcBef>
+                <a:spcPts val="0"/>
+              </a:spcBef>
+              <a:buNone/>
+            </a:pPr>
+            <a:r>
+              <a:rPr lang="en-US" sz="1800" dirty="0">
+                <a:solidFill>
+                  <a:srgbClr val="0070C0"/>
+                </a:solidFill>
+                <a:latin typeface="Menlo" panose="020B0609030804020204" pitchFamily="49" charset="0"/>
+                <a:ea typeface="Menlo" panose="020B0609030804020204" pitchFamily="49" charset="0"/>
+                <a:cs typeface="Menlo" panose="020B0609030804020204" pitchFamily="49" charset="0"/>
+              </a:rPr>
+              <a:t>margin-bottom:15px;</a:t>
+            </a:r>
+          </a:p>
+          <a:p>
+            <a:pPr marL="460375" indent="0">
+              <a:spcBef>
+                <a:spcPts val="0"/>
+              </a:spcBef>
+              <a:buNone/>
+            </a:pPr>
+            <a:r>
+              <a:rPr lang="en-US" sz="1800" dirty="0">
+                <a:solidFill>
+                  <a:srgbClr val="0070C0"/>
+                </a:solidFill>
+                <a:latin typeface="Menlo" panose="020B0609030804020204" pitchFamily="49" charset="0"/>
+                <a:ea typeface="Menlo" panose="020B0609030804020204" pitchFamily="49" charset="0"/>
+                <a:cs typeface="Menlo" panose="020B0609030804020204" pitchFamily="49" charset="0"/>
+              </a:rPr>
+              <a:t>padding-top:15px;</a:t>
+            </a:r>
+          </a:p>
+          <a:p>
+            <a:pPr marL="460375" indent="0">
+              <a:spcBef>
+                <a:spcPts val="0"/>
+              </a:spcBef>
+              <a:buNone/>
+            </a:pPr>
+            <a:r>
+              <a:rPr lang="en-US" sz="1800" dirty="0">
+                <a:solidFill>
+                  <a:srgbClr val="0070C0"/>
+                </a:solidFill>
+                <a:latin typeface="Menlo" panose="020B0609030804020204" pitchFamily="49" charset="0"/>
+                <a:ea typeface="Menlo" panose="020B0609030804020204" pitchFamily="49" charset="0"/>
+                <a:cs typeface="Menlo" panose="020B0609030804020204" pitchFamily="49" charset="0"/>
+              </a:rPr>
+              <a:t>border-radius: 10px;</a:t>
+            </a:r>
+          </a:p>
+          <a:p>
+            <a:pPr marL="460375" indent="0">
+              <a:spcBef>
+                <a:spcPts val="0"/>
+              </a:spcBef>
+              <a:buNone/>
+            </a:pPr>
+            <a:r>
+              <a:rPr lang="en-US" sz="1800" dirty="0">
+                <a:solidFill>
+                  <a:srgbClr val="0070C0"/>
+                </a:solidFill>
+                <a:latin typeface="Menlo" panose="020B0609030804020204" pitchFamily="49" charset="0"/>
+                <a:ea typeface="Menlo" panose="020B0609030804020204" pitchFamily="49" charset="0"/>
+                <a:cs typeface="Menlo" panose="020B0609030804020204" pitchFamily="49" charset="0"/>
+              </a:rPr>
+              <a:t>border: 5px solid </a:t>
+            </a:r>
+            <a:r>
+              <a:rPr lang="en-US" sz="1800" dirty="0" err="1">
+                <a:solidFill>
+                  <a:srgbClr val="0070C0"/>
+                </a:solidFill>
+                <a:latin typeface="Menlo" panose="020B0609030804020204" pitchFamily="49" charset="0"/>
+                <a:ea typeface="Menlo" panose="020B0609030804020204" pitchFamily="49" charset="0"/>
+                <a:cs typeface="Menlo" panose="020B0609030804020204" pitchFamily="49" charset="0"/>
+              </a:rPr>
+              <a:t>darkgreen</a:t>
+            </a:r>
+            <a:r>
+              <a:rPr lang="en-US" sz="1800" dirty="0">
+                <a:solidFill>
+                  <a:srgbClr val="0070C0"/>
+                </a:solidFill>
+                <a:latin typeface="Menlo" panose="020B0609030804020204" pitchFamily="49" charset="0"/>
+                <a:ea typeface="Menlo" panose="020B0609030804020204" pitchFamily="49" charset="0"/>
+                <a:cs typeface="Menlo" panose="020B0609030804020204" pitchFamily="49" charset="0"/>
+              </a:rPr>
+              <a:t>;</a:t>
+            </a:r>
+          </a:p>
+          <a:p>
+            <a:pPr marL="460375" indent="0">
+              <a:spcBef>
+                <a:spcPts val="1200"/>
+              </a:spcBef>
+              <a:buNone/>
+            </a:pPr>
+            <a:r>
+              <a:rPr lang="en-US" dirty="0"/>
+              <a:t>Save the CSS file and refresh Edge.</a:t>
+            </a:r>
+          </a:p>
+          <a:p>
+            <a:pPr marL="460375" indent="0">
+              <a:buNone/>
+            </a:pPr>
+            <a:r>
+              <a:rPr lang="en-US" i="1" dirty="0"/>
+              <a:t>Better?</a:t>
+            </a:r>
+          </a:p>
+          <a:p>
+            <a:pPr marL="460375" indent="0">
+              <a:buNone/>
+            </a:pPr>
+            <a:r>
+              <a:rPr lang="en-US" i="1" dirty="0"/>
+              <a:t>You get the idea -- the potential of customizing a web page. </a:t>
+            </a:r>
+            <a:r>
+              <a:rPr lang="en-US" b="1" i="1" dirty="0"/>
+              <a:t>GREAT WORK!</a:t>
+            </a:r>
+          </a:p>
+          <a:p>
             <a:pPr marL="0" indent="0">
               <a:buNone/>
             </a:pPr>
-            <a:r>
-              <a:rPr lang="en-US" dirty="0"/>
-              <a:t>Let's make some changing in CSS, to experience its power.</a:t>
-            </a:r>
-          </a:p>
-          <a:p>
-            <a:r>
-              <a:rPr lang="en-US" dirty="0"/>
-              <a:t>In the SVP-LLM-Web folder, locate the </a:t>
-            </a:r>
-            <a:r>
-              <a:rPr lang="en-US" b="1" dirty="0" err="1"/>
-              <a:t>svpcss.css</a:t>
-            </a:r>
-            <a:r>
-              <a:rPr lang="en-US" dirty="0"/>
-              <a:t> file. Drag the file icon </a:t>
-            </a:r>
-            <a:r>
-              <a:rPr lang="en-US" i="1" dirty="0"/>
-              <a:t>next</a:t>
-            </a:r>
-            <a:r>
-              <a:rPr lang="en-US" dirty="0"/>
-              <a:t> to </a:t>
-            </a:r>
-            <a:br>
-              <a:rPr lang="en-US" dirty="0"/>
-            </a:br>
-            <a:r>
-              <a:rPr lang="en-US" dirty="0"/>
-              <a:t>the tab with </a:t>
-            </a:r>
-            <a:r>
-              <a:rPr lang="en-US" dirty="0" err="1"/>
-              <a:t>index.html</a:t>
-            </a:r>
-            <a:r>
-              <a:rPr lang="en-US" dirty="0"/>
-              <a:t>, and release.</a:t>
-            </a:r>
-            <a:br>
-              <a:rPr lang="en-US" dirty="0"/>
-            </a:br>
-            <a:r>
-              <a:rPr lang="en-US" i="1" dirty="0"/>
-              <a:t>You should be looking at CSS code...</a:t>
-            </a:r>
-            <a:endParaRPr lang="en-US" dirty="0"/>
-          </a:p>
-          <a:p>
-            <a:pPr marL="0" indent="0">
-              <a:buNone/>
-            </a:pPr>
-            <a:endParaRPr lang="en-US" dirty="0"/>
-          </a:p>
-          <a:p>
-            <a:pPr indent="0">
-              <a:buNone/>
-            </a:pPr>
-            <a:r>
-              <a:rPr lang="en-US" dirty="0"/>
-              <a:t>We will next work on improving the instruction box in a variety of ways. </a:t>
-            </a:r>
             <a:endParaRPr lang="en-US" sz="1400" dirty="0">
               <a:latin typeface="Menlo" panose="020B0609030804020204" pitchFamily="49" charset="0"/>
               <a:ea typeface="Menlo" panose="020B0609030804020204" pitchFamily="49" charset="0"/>
@@ -10018,10 +10281,10 @@
       </p:sp>
       <p:pic>
         <p:nvPicPr>
-          <p:cNvPr id="4" name="Picture 3">
+          <p:cNvPr id="6" name="Picture 5">
             <a:extLst>
               <a:ext uri="{FF2B5EF4-FFF2-40B4-BE49-F238E27FC236}">
-                <a16:creationId xmlns:a16="http://schemas.microsoft.com/office/drawing/2014/main" id="{C6103B6A-FF13-76C1-638A-C2287B74436B}"/>
+                <a16:creationId xmlns:a16="http://schemas.microsoft.com/office/drawing/2014/main" id="{40D3022F-F570-FCD4-FB47-595C29482956}"/>
               </a:ext>
             </a:extLst>
           </p:cNvPr>
@@ -10032,13 +10295,14 @@
         </p:nvPicPr>
         <p:blipFill>
           <a:blip r:embed="rId2"/>
-          <a:srcRect l="16147" t="41481" r="14903"/>
-          <a:stretch/>
+          <a:stretch>
+            <a:fillRect/>
+          </a:stretch>
         </p:blipFill>
         <p:spPr>
           <a:xfrm>
-            <a:off x="6664529" y="1689100"/>
-            <a:ext cx="5113994" cy="4013200"/>
+            <a:off x="7315200" y="1555750"/>
+            <a:ext cx="4490499" cy="4172454"/>
           </a:xfrm>
           <a:prstGeom prst="rect">
             <a:avLst/>
@@ -10048,7 +10312,7 @@
     </p:spTree>
     <p:extLst>
       <p:ext uri="{BB962C8B-B14F-4D97-AF65-F5344CB8AC3E}">
-        <p14:creationId xmlns:p14="http://schemas.microsoft.com/office/powerpoint/2010/main" val="2103626714"/>
+        <p14:creationId xmlns:p14="http://schemas.microsoft.com/office/powerpoint/2010/main" val="396788720"/>
       </p:ext>
     </p:extLst>
   </p:cSld>
@@ -10256,7 +10520,7 @@
           <a:p>
             <a:r>
               <a:rPr lang="en-US" dirty="0"/>
-              <a:t>Task 4 - In CSS</a:t>
+              <a:t>Finally, Ask a question!</a:t>
             </a:r>
           </a:p>
         </p:txBody>
@@ -10280,7 +10544,7 @@
         <p:spPr>
           <a:xfrm>
             <a:off x="1251678" y="1311007"/>
-            <a:ext cx="5898422" cy="5277080"/>
+            <a:ext cx="5211751" cy="5277080"/>
           </a:xfrm>
         </p:spPr>
         <p:txBody>
@@ -10289,223 +10553,90 @@
           </a:bodyPr>
           <a:lstStyle/>
           <a:p>
-            <a:pPr marL="457200" indent="-457200">
-              <a:buFont typeface="+mj-lt"/>
-              <a:buAutoNum type="arabicPeriod" startAt="6"/>
-            </a:pPr>
-            <a:r>
-              <a:rPr lang="en-US" dirty="0"/>
-              <a:t>Search for "Task 4". Below the comment is the ID instruction (block) rule. Change the lines of CSS between the { } brackets to what is shown below:</a:t>
-            </a:r>
-          </a:p>
-          <a:p>
-            <a:pPr marL="460375" indent="0">
-              <a:spcBef>
-                <a:spcPts val="0"/>
-              </a:spcBef>
+            <a:pPr marL="0" indent="0">
               <a:buNone/>
             </a:pPr>
             <a:r>
-              <a:rPr lang="en-US" sz="1800" dirty="0">
-                <a:solidFill>
-                  <a:srgbClr val="0070C0"/>
-                </a:solidFill>
-                <a:latin typeface="Menlo" panose="020B0609030804020204" pitchFamily="49" charset="0"/>
-                <a:ea typeface="Menlo" panose="020B0609030804020204" pitchFamily="49" charset="0"/>
-                <a:cs typeface="Menlo" panose="020B0609030804020204" pitchFamily="49" charset="0"/>
-              </a:rPr>
-              <a:t>margin-inline: auto;</a:t>
-            </a:r>
-          </a:p>
-          <a:p>
-            <a:pPr marL="460375" indent="0">
+              <a:rPr lang="en-US" dirty="0"/>
+              <a:t>This page has a function - it is a simple AI chat bot. Type in a question and evaluate the answer it gives you.</a:t>
+            </a:r>
+          </a:p>
+          <a:p>
+            <a:pPr>
               <a:spcBef>
-                <a:spcPts val="0"/>
+                <a:spcPts val="1200"/>
               </a:spcBef>
-              <a:buNone/>
             </a:pPr>
             <a:r>
-              <a:rPr lang="en-US" sz="1800" dirty="0">
-                <a:solidFill>
-                  <a:srgbClr val="0070C0"/>
-                </a:solidFill>
-                <a:latin typeface="Menlo" panose="020B0609030804020204" pitchFamily="49" charset="0"/>
-                <a:ea typeface="Menlo" panose="020B0609030804020204" pitchFamily="49" charset="0"/>
-                <a:cs typeface="Menlo" panose="020B0609030804020204" pitchFamily="49" charset="0"/>
-              </a:rPr>
-              <a:t>width: 50%;</a:t>
-            </a:r>
-          </a:p>
-          <a:p>
-            <a:pPr marL="460375" indent="0">
+              <a:rPr lang="en-US" dirty="0"/>
+              <a:t>Example: </a:t>
+            </a:r>
+            <a:r>
+              <a:rPr lang="en-US" i="1" dirty="0"/>
+              <a:t>what are 10 good study habits for a college freshman?</a:t>
+            </a:r>
+          </a:p>
+          <a:p>
+            <a:pPr>
               <a:spcBef>
-                <a:spcPts val="0"/>
+                <a:spcPts val="1200"/>
               </a:spcBef>
-              <a:buNone/>
             </a:pPr>
             <a:r>
-              <a:rPr lang="en-US" sz="1800" dirty="0">
-                <a:solidFill>
-                  <a:srgbClr val="0070C0"/>
-                </a:solidFill>
-                <a:latin typeface="Menlo" panose="020B0609030804020204" pitchFamily="49" charset="0"/>
-                <a:ea typeface="Menlo" panose="020B0609030804020204" pitchFamily="49" charset="0"/>
-                <a:cs typeface="Menlo" panose="020B0609030804020204" pitchFamily="49" charset="0"/>
-              </a:rPr>
-              <a:t>background-color: var(--</a:t>
-            </a:r>
-            <a:r>
-              <a:rPr lang="en-US" sz="1800" dirty="0" err="1">
-                <a:solidFill>
-                  <a:srgbClr val="0070C0"/>
-                </a:solidFill>
-                <a:latin typeface="Menlo" panose="020B0609030804020204" pitchFamily="49" charset="0"/>
-                <a:ea typeface="Menlo" panose="020B0609030804020204" pitchFamily="49" charset="0"/>
-                <a:cs typeface="Menlo" panose="020B0609030804020204" pitchFamily="49" charset="0"/>
-              </a:rPr>
-              <a:t>rit-accgreen</a:t>
-            </a:r>
-            <a:r>
-              <a:rPr lang="en-US" sz="1800" dirty="0">
-                <a:solidFill>
-                  <a:srgbClr val="0070C0"/>
-                </a:solidFill>
-                <a:latin typeface="Menlo" panose="020B0609030804020204" pitchFamily="49" charset="0"/>
-                <a:ea typeface="Menlo" panose="020B0609030804020204" pitchFamily="49" charset="0"/>
-                <a:cs typeface="Menlo" panose="020B0609030804020204" pitchFamily="49" charset="0"/>
-              </a:rPr>
-              <a:t>);</a:t>
-            </a:r>
-          </a:p>
-          <a:p>
-            <a:pPr marL="460375" indent="0">
+              <a:rPr lang="en-US" i="1" dirty="0"/>
+              <a:t>What are the top 10 things I should learn about HTML5?</a:t>
+            </a:r>
+          </a:p>
+          <a:p>
+            <a:pPr>
               <a:spcBef>
-                <a:spcPts val="0"/>
+                <a:spcPts val="1200"/>
               </a:spcBef>
-              <a:buNone/>
             </a:pPr>
             <a:r>
-              <a:rPr lang="en-US" sz="1800" dirty="0" err="1">
-                <a:solidFill>
-                  <a:srgbClr val="0070C0"/>
-                </a:solidFill>
-                <a:latin typeface="Menlo" panose="020B0609030804020204" pitchFamily="49" charset="0"/>
-                <a:ea typeface="Menlo" panose="020B0609030804020204" pitchFamily="49" charset="0"/>
-                <a:cs typeface="Menlo" panose="020B0609030804020204" pitchFamily="49" charset="0"/>
-              </a:rPr>
-              <a:t>color:white</a:t>
-            </a:r>
-            <a:r>
-              <a:rPr lang="en-US" sz="1800" dirty="0">
-                <a:solidFill>
-                  <a:srgbClr val="0070C0"/>
-                </a:solidFill>
-                <a:latin typeface="Menlo" panose="020B0609030804020204" pitchFamily="49" charset="0"/>
-                <a:ea typeface="Menlo" panose="020B0609030804020204" pitchFamily="49" charset="0"/>
-                <a:cs typeface="Menlo" panose="020B0609030804020204" pitchFamily="49" charset="0"/>
-              </a:rPr>
-              <a:t>;</a:t>
-            </a:r>
-          </a:p>
-          <a:p>
-            <a:pPr marL="460375" indent="0">
+              <a:rPr lang="en-US" i="1" dirty="0"/>
+              <a:t>How are 5 ways I can maintain my mental health as a freshman college student?</a:t>
+            </a:r>
+          </a:p>
+          <a:p>
+            <a:pPr>
               <a:spcBef>
-                <a:spcPts val="0"/>
+                <a:spcPts val="1200"/>
               </a:spcBef>
-              <a:buNone/>
             </a:pPr>
-            <a:r>
-              <a:rPr lang="en-US" sz="1800" dirty="0">
-                <a:solidFill>
-                  <a:srgbClr val="0070C0"/>
-                </a:solidFill>
-                <a:latin typeface="Menlo" panose="020B0609030804020204" pitchFamily="49" charset="0"/>
-                <a:ea typeface="Menlo" panose="020B0609030804020204" pitchFamily="49" charset="0"/>
-                <a:cs typeface="Menlo" panose="020B0609030804020204" pitchFamily="49" charset="0"/>
-              </a:rPr>
-              <a:t>margin-bottom:15px;</a:t>
-            </a:r>
-          </a:p>
-          <a:p>
-            <a:pPr marL="460375" indent="0">
-              <a:spcBef>
-                <a:spcPts val="0"/>
-              </a:spcBef>
-              <a:buNone/>
-            </a:pPr>
-            <a:r>
-              <a:rPr lang="en-US" sz="1800" dirty="0">
-                <a:solidFill>
-                  <a:srgbClr val="0070C0"/>
-                </a:solidFill>
-                <a:latin typeface="Menlo" panose="020B0609030804020204" pitchFamily="49" charset="0"/>
-                <a:ea typeface="Menlo" panose="020B0609030804020204" pitchFamily="49" charset="0"/>
-                <a:cs typeface="Menlo" panose="020B0609030804020204" pitchFamily="49" charset="0"/>
-              </a:rPr>
-              <a:t>padding-top:15px;</a:t>
-            </a:r>
-          </a:p>
-          <a:p>
-            <a:pPr marL="460375" indent="0">
-              <a:spcBef>
-                <a:spcPts val="0"/>
-              </a:spcBef>
-              <a:buNone/>
-            </a:pPr>
-            <a:r>
-              <a:rPr lang="en-US" sz="1800" dirty="0">
-                <a:solidFill>
-                  <a:srgbClr val="0070C0"/>
-                </a:solidFill>
-                <a:latin typeface="Menlo" panose="020B0609030804020204" pitchFamily="49" charset="0"/>
-                <a:ea typeface="Menlo" panose="020B0609030804020204" pitchFamily="49" charset="0"/>
-                <a:cs typeface="Menlo" panose="020B0609030804020204" pitchFamily="49" charset="0"/>
-              </a:rPr>
-              <a:t>border-radius: 10px;</a:t>
-            </a:r>
-          </a:p>
-          <a:p>
-            <a:pPr marL="460375" indent="0">
+            <a:endParaRPr lang="en-US" i="1" dirty="0"/>
+          </a:p>
+          <a:p>
+            <a:pPr marL="0" indent="0" algn="ctr">
               <a:spcBef>
                 <a:spcPts val="1200"/>
               </a:spcBef>
               <a:buNone/>
             </a:pPr>
             <a:r>
-              <a:rPr lang="en-US" dirty="0"/>
-              <a:t>Save the CSS file and refresh Edge.</a:t>
-            </a:r>
-          </a:p>
-          <a:p>
-            <a:pPr marL="460375" indent="0">
+              <a:rPr lang="en-US" i="1" dirty="0"/>
+              <a:t>Thank you for attending.</a:t>
+            </a:r>
+          </a:p>
+          <a:p>
+            <a:pPr marL="0" indent="0" algn="ctr">
+              <a:spcBef>
+                <a:spcPts val="1200"/>
+              </a:spcBef>
               <a:buNone/>
             </a:pPr>
             <a:r>
-              <a:rPr lang="en-US" i="1" dirty="0"/>
-              <a:t>Better?</a:t>
-            </a:r>
-          </a:p>
-          <a:p>
-            <a:pPr marL="460375" indent="0">
-              <a:buNone/>
-            </a:pPr>
-            <a:r>
-              <a:rPr lang="en-US" i="1" dirty="0"/>
-              <a:t>You get the idea -- the potential of customizing a web page. </a:t>
-            </a:r>
-            <a:r>
-              <a:rPr lang="en-US" b="1" i="1" dirty="0"/>
-              <a:t>GREAT WORK!</a:t>
-            </a:r>
-          </a:p>
-          <a:p>
-            <a:pPr marL="0" indent="0">
-              <a:buNone/>
-            </a:pPr>
-            <a:endParaRPr lang="en-US" sz="1400" dirty="0">
-              <a:latin typeface="Menlo" panose="020B0609030804020204" pitchFamily="49" charset="0"/>
-              <a:ea typeface="Menlo" panose="020B0609030804020204" pitchFamily="49" charset="0"/>
-              <a:cs typeface="Menlo" panose="020B0609030804020204" pitchFamily="49" charset="0"/>
+              <a:rPr lang="en-US" b="1" i="1" dirty="0">
+                <a:solidFill>
+                  <a:srgbClr val="0070C0"/>
+                </a:solidFill>
+              </a:rPr>
+              <a:t>QUESTIONS??</a:t>
+            </a:r>
+            <a:endParaRPr lang="en-US" b="1" dirty="0">
+              <a:solidFill>
+                <a:srgbClr val="0070C0"/>
+              </a:solidFill>
             </a:endParaRPr>
           </a:p>
           <a:p>
@@ -10532,10 +10663,10 @@
       </p:sp>
       <p:pic>
         <p:nvPicPr>
-          <p:cNvPr id="6" name="Picture 5">
+          <p:cNvPr id="4" name="Picture 3">
             <a:extLst>
               <a:ext uri="{FF2B5EF4-FFF2-40B4-BE49-F238E27FC236}">
-                <a16:creationId xmlns:a16="http://schemas.microsoft.com/office/drawing/2014/main" id="{40D3022F-F570-FCD4-FB47-595C29482956}"/>
+                <a16:creationId xmlns:a16="http://schemas.microsoft.com/office/drawing/2014/main" id="{C6103B6A-FF13-76C1-638A-C2287B74436B}"/>
               </a:ext>
             </a:extLst>
           </p:cNvPr>
@@ -10546,24 +10677,76 @@
         </p:nvPicPr>
         <p:blipFill>
           <a:blip r:embed="rId2"/>
-          <a:stretch>
-            <a:fillRect/>
-          </a:stretch>
+          <a:srcRect l="16147" t="41481" r="14903"/>
+          <a:stretch/>
         </p:blipFill>
         <p:spPr>
           <a:xfrm>
-            <a:off x="7315200" y="1555750"/>
-            <a:ext cx="4490499" cy="4172454"/>
+            <a:off x="6664529" y="1689100"/>
+            <a:ext cx="5113994" cy="4013200"/>
           </a:xfrm>
           <a:prstGeom prst="rect">
             <a:avLst/>
           </a:prstGeom>
         </p:spPr>
       </p:pic>
+      <p:sp>
+        <p:nvSpPr>
+          <p:cNvPr id="5" name="TextBox 4">
+            <a:extLst>
+              <a:ext uri="{FF2B5EF4-FFF2-40B4-BE49-F238E27FC236}">
+                <a16:creationId xmlns:a16="http://schemas.microsoft.com/office/drawing/2014/main" id="{EB1DC3B2-031F-D40C-6EF3-7DA15F6DDBC6}"/>
+              </a:ext>
+            </a:extLst>
+          </p:cNvPr>
+          <p:cNvSpPr txBox="1"/>
+          <p:nvPr/>
+        </p:nvSpPr>
+        <p:spPr>
+          <a:xfrm>
+            <a:off x="7962563" y="2387150"/>
+            <a:ext cx="2981009" cy="1200329"/>
+          </a:xfrm>
+          <a:prstGeom prst="rect">
+            <a:avLst/>
+          </a:prstGeom>
+          <a:noFill/>
+        </p:spPr>
+        <p:txBody>
+          <a:bodyPr wrap="none" rtlCol="0">
+            <a:spAutoFit/>
+          </a:bodyPr>
+          <a:lstStyle/>
+          <a:p>
+            <a:r>
+              <a:rPr lang="en-US" dirty="0"/>
+              <a:t>THIS SLIDE NEED TO BE</a:t>
+            </a:r>
+          </a:p>
+          <a:p>
+            <a:r>
+              <a:rPr lang="en-US" dirty="0"/>
+              <a:t>CHANGED TO ONE</a:t>
+            </a:r>
+          </a:p>
+          <a:p>
+            <a:r>
+              <a:rPr lang="en-US" dirty="0"/>
+              <a:t>THAT SHOWS THE AI WITH</a:t>
+            </a:r>
+          </a:p>
+          <a:p>
+            <a:r>
+              <a:rPr lang="en-US" dirty="0"/>
+              <a:t>ANSWERS.</a:t>
+            </a:r>
+          </a:p>
+        </p:txBody>
+      </p:sp>
     </p:spTree>
     <p:extLst>
       <p:ext uri="{BB962C8B-B14F-4D97-AF65-F5344CB8AC3E}">
-        <p14:creationId xmlns:p14="http://schemas.microsoft.com/office/powerpoint/2010/main" val="396788720"/>
+        <p14:creationId xmlns:p14="http://schemas.microsoft.com/office/powerpoint/2010/main" val="608305271"/>
       </p:ext>
     </p:extLst>
   </p:cSld>

</xml_diff>